<commit_message>
Add configuration notes for multiple OSCPoint connections and update connection examples
</commit_message>
<xml_diff>
--- a/assets/connection_examples/connnection_examples.pptx
+++ b/assets/connection_examples/connnection_examples.pptx
@@ -7,7 +7,8 @@
   <p:sldIdLst>
     <p:sldId id="257" r:id="rId2"/>
     <p:sldId id="256" r:id="rId3"/>
-    <p:sldId id="258" r:id="rId4"/>
+    <p:sldId id="261" r:id="rId4"/>
+    <p:sldId id="258" r:id="rId5"/>
   </p:sldIdLst>
   <p:sldSz cx="12192000" cy="6858000"/>
   <p:notesSz cx="6858000" cy="9144000"/>
@@ -263,7 +264,7 @@
           <a:p>
             <a:fld id="{B63EEEC3-8F60-488A-8608-79DBEF511568}" type="datetimeFigureOut">
               <a:rPr lang="en-GB" smtClean="0"/>
-              <a:t>25/07/2024</a:t>
+              <a:t>05/01/2025</a:t>
             </a:fld>
             <a:endParaRPr lang="en-GB"/>
           </a:p>
@@ -463,7 +464,7 @@
           <a:p>
             <a:fld id="{B63EEEC3-8F60-488A-8608-79DBEF511568}" type="datetimeFigureOut">
               <a:rPr lang="en-GB" smtClean="0"/>
-              <a:t>25/07/2024</a:t>
+              <a:t>05/01/2025</a:t>
             </a:fld>
             <a:endParaRPr lang="en-GB"/>
           </a:p>
@@ -673,7 +674,7 @@
           <a:p>
             <a:fld id="{B63EEEC3-8F60-488A-8608-79DBEF511568}" type="datetimeFigureOut">
               <a:rPr lang="en-GB" smtClean="0"/>
-              <a:t>25/07/2024</a:t>
+              <a:t>05/01/2025</a:t>
             </a:fld>
             <a:endParaRPr lang="en-GB"/>
           </a:p>
@@ -873,7 +874,7 @@
           <a:p>
             <a:fld id="{B63EEEC3-8F60-488A-8608-79DBEF511568}" type="datetimeFigureOut">
               <a:rPr lang="en-GB" smtClean="0"/>
-              <a:t>25/07/2024</a:t>
+              <a:t>05/01/2025</a:t>
             </a:fld>
             <a:endParaRPr lang="en-GB"/>
           </a:p>
@@ -1149,7 +1150,7 @@
           <a:p>
             <a:fld id="{B63EEEC3-8F60-488A-8608-79DBEF511568}" type="datetimeFigureOut">
               <a:rPr lang="en-GB" smtClean="0"/>
-              <a:t>25/07/2024</a:t>
+              <a:t>05/01/2025</a:t>
             </a:fld>
             <a:endParaRPr lang="en-GB"/>
           </a:p>
@@ -1417,7 +1418,7 @@
           <a:p>
             <a:fld id="{B63EEEC3-8F60-488A-8608-79DBEF511568}" type="datetimeFigureOut">
               <a:rPr lang="en-GB" smtClean="0"/>
-              <a:t>25/07/2024</a:t>
+              <a:t>05/01/2025</a:t>
             </a:fld>
             <a:endParaRPr lang="en-GB"/>
           </a:p>
@@ -1832,7 +1833,7 @@
           <a:p>
             <a:fld id="{B63EEEC3-8F60-488A-8608-79DBEF511568}" type="datetimeFigureOut">
               <a:rPr lang="en-GB" smtClean="0"/>
-              <a:t>25/07/2024</a:t>
+              <a:t>05/01/2025</a:t>
             </a:fld>
             <a:endParaRPr lang="en-GB"/>
           </a:p>
@@ -1974,7 +1975,7 @@
           <a:p>
             <a:fld id="{B63EEEC3-8F60-488A-8608-79DBEF511568}" type="datetimeFigureOut">
               <a:rPr lang="en-GB" smtClean="0"/>
-              <a:t>25/07/2024</a:t>
+              <a:t>05/01/2025</a:t>
             </a:fld>
             <a:endParaRPr lang="en-GB"/>
           </a:p>
@@ -2087,7 +2088,7 @@
           <a:p>
             <a:fld id="{B63EEEC3-8F60-488A-8608-79DBEF511568}" type="datetimeFigureOut">
               <a:rPr lang="en-GB" smtClean="0"/>
-              <a:t>25/07/2024</a:t>
+              <a:t>05/01/2025</a:t>
             </a:fld>
             <a:endParaRPr lang="en-GB"/>
           </a:p>
@@ -2400,7 +2401,7 @@
           <a:p>
             <a:fld id="{B63EEEC3-8F60-488A-8608-79DBEF511568}" type="datetimeFigureOut">
               <a:rPr lang="en-GB" smtClean="0"/>
-              <a:t>25/07/2024</a:t>
+              <a:t>05/01/2025</a:t>
             </a:fld>
             <a:endParaRPr lang="en-GB"/>
           </a:p>
@@ -2689,7 +2690,7 @@
           <a:p>
             <a:fld id="{B63EEEC3-8F60-488A-8608-79DBEF511568}" type="datetimeFigureOut">
               <a:rPr lang="en-GB" smtClean="0"/>
-              <a:t>25/07/2024</a:t>
+              <a:t>05/01/2025</a:t>
             </a:fld>
             <a:endParaRPr lang="en-GB"/>
           </a:p>
@@ -2932,7 +2933,7 @@
           <a:p>
             <a:fld id="{B63EEEC3-8F60-488A-8608-79DBEF511568}" type="datetimeFigureOut">
               <a:rPr lang="en-GB" smtClean="0"/>
-              <a:t>25/07/2024</a:t>
+              <a:t>05/01/2025</a:t>
             </a:fld>
             <a:endParaRPr lang="en-GB"/>
           </a:p>
@@ -5054,6 +5055,1665 @@
 </file>
 
 <file path=ppt/slides/slide3.xml><?xml version="1.0" encoding="utf-8"?>
+<p:sld xmlns:a="http://schemas.openxmlformats.org/drawingml/2006/main" xmlns:r="http://schemas.openxmlformats.org/officeDocument/2006/relationships" xmlns:p="http://schemas.openxmlformats.org/presentationml/2006/main">
+  <p:cSld>
+    <p:bg>
+      <p:bgPr>
+        <a:solidFill>
+          <a:schemeClr val="bg1">
+            <a:alpha val="0"/>
+          </a:schemeClr>
+        </a:solidFill>
+        <a:effectLst/>
+      </p:bgPr>
+    </p:bg>
+    <p:spTree>
+      <p:nvGrpSpPr>
+        <p:cNvPr id="1" name="">
+          <a:extLst>
+            <a:ext uri="{FF2B5EF4-FFF2-40B4-BE49-F238E27FC236}">
+              <a16:creationId xmlns:a16="http://schemas.microsoft.com/office/drawing/2014/main" id="{61E013BA-516E-A45B-2451-310A781B9BC3}"/>
+            </a:ext>
+          </a:extLst>
+        </p:cNvPr>
+        <p:cNvGrpSpPr/>
+        <p:nvPr/>
+      </p:nvGrpSpPr>
+      <p:grpSpPr>
+        <a:xfrm>
+          <a:off x="0" y="0"/>
+          <a:ext cx="0" cy="0"/>
+          <a:chOff x="0" y="0"/>
+          <a:chExt cx="0" cy="0"/>
+        </a:xfrm>
+      </p:grpSpPr>
+      <p:sp>
+        <p:nvSpPr>
+          <p:cNvPr id="2" name="TextBox 1">
+            <a:extLst>
+              <a:ext uri="{FF2B5EF4-FFF2-40B4-BE49-F238E27FC236}">
+                <a16:creationId xmlns:a16="http://schemas.microsoft.com/office/drawing/2014/main" id="{2C8391C6-53FF-9DED-256F-014DFF1CADEA}"/>
+              </a:ext>
+            </a:extLst>
+          </p:cNvPr>
+          <p:cNvSpPr txBox="1">
+            <a:spLocks/>
+          </p:cNvSpPr>
+          <p:nvPr/>
+        </p:nvSpPr>
+        <p:spPr>
+          <a:xfrm>
+            <a:off x="1693816" y="274320"/>
+            <a:ext cx="8116389" cy="3803575"/>
+          </a:xfrm>
+          <a:prstGeom prst="roundRect">
+            <a:avLst/>
+          </a:prstGeom>
+          <a:solidFill>
+            <a:schemeClr val="tx2">
+              <a:lumMod val="10000"/>
+              <a:lumOff val="90000"/>
+            </a:schemeClr>
+          </a:solidFill>
+          <a:ln w="38100">
+            <a:solidFill>
+              <a:schemeClr val="bg2">
+                <a:lumMod val="10000"/>
+              </a:schemeClr>
+            </a:solidFill>
+          </a:ln>
+        </p:spPr>
+        <p:txBody>
+          <a:bodyPr wrap="square" rtlCol="0" anchor="ctr" anchorCtr="0">
+            <a:noAutofit/>
+          </a:bodyPr>
+          <a:lstStyle/>
+          <a:p>
+            <a:pPr algn="ctr"/>
+            <a:endParaRPr lang="en-US" dirty="0">
+              <a:latin typeface="Karbon Medium" panose="00000600000000000000" pitchFamily="50" charset="0"/>
+            </a:endParaRPr>
+          </a:p>
+        </p:txBody>
+      </p:sp>
+      <p:grpSp>
+        <p:nvGrpSpPr>
+          <p:cNvPr id="6" name="Group 5">
+            <a:extLst>
+              <a:ext uri="{FF2B5EF4-FFF2-40B4-BE49-F238E27FC236}">
+                <a16:creationId xmlns:a16="http://schemas.microsoft.com/office/drawing/2014/main" id="{31C88442-9DDE-FE70-4F4C-83EB4868667E}"/>
+              </a:ext>
+            </a:extLst>
+          </p:cNvPr>
+          <p:cNvGrpSpPr/>
+          <p:nvPr/>
+        </p:nvGrpSpPr>
+        <p:grpSpPr>
+          <a:xfrm>
+            <a:off x="1939268" y="958470"/>
+            <a:ext cx="2146852" cy="2916839"/>
+            <a:chOff x="954415" y="2235200"/>
+            <a:chExt cx="2146852" cy="2387600"/>
+          </a:xfrm>
+        </p:grpSpPr>
+        <p:sp>
+          <p:nvSpPr>
+            <p:cNvPr id="4" name="TextBox 3">
+              <a:extLst>
+                <a:ext uri="{FF2B5EF4-FFF2-40B4-BE49-F238E27FC236}">
+                  <a16:creationId xmlns:a16="http://schemas.microsoft.com/office/drawing/2014/main" id="{52CCE898-2194-C814-B289-977A28006F4C}"/>
+                </a:ext>
+              </a:extLst>
+            </p:cNvPr>
+            <p:cNvSpPr txBox="1"/>
+            <p:nvPr/>
+          </p:nvSpPr>
+          <p:spPr>
+            <a:xfrm>
+              <a:off x="954415" y="2235200"/>
+              <a:ext cx="2146852" cy="2387600"/>
+            </a:xfrm>
+            <a:prstGeom prst="roundRect">
+              <a:avLst/>
+            </a:prstGeom>
+            <a:solidFill>
+              <a:schemeClr val="bg2"/>
+            </a:solidFill>
+            <a:ln w="38100">
+              <a:solidFill>
+                <a:schemeClr val="bg2">
+                  <a:lumMod val="10000"/>
+                </a:schemeClr>
+              </a:solidFill>
+            </a:ln>
+          </p:spPr>
+          <p:txBody>
+            <a:bodyPr wrap="square" rtlCol="0" anchor="ctr" anchorCtr="0">
+              <a:noAutofit/>
+            </a:bodyPr>
+            <a:lstStyle/>
+            <a:p>
+              <a:pPr algn="ctr"/>
+              <a:endParaRPr lang="en-US" dirty="0">
+                <a:latin typeface="Karbon Medium" panose="00000600000000000000" pitchFamily="50" charset="0"/>
+              </a:endParaRPr>
+            </a:p>
+            <a:p>
+              <a:pPr algn="ctr"/>
+              <a:endParaRPr lang="en-US" dirty="0">
+                <a:latin typeface="Karbon Medium" panose="00000600000000000000" pitchFamily="50" charset="0"/>
+              </a:endParaRPr>
+            </a:p>
+            <a:p>
+              <a:pPr algn="ctr"/>
+              <a:endParaRPr lang="en-US" dirty="0">
+                <a:latin typeface="Karbon Medium" panose="00000600000000000000" pitchFamily="50" charset="0"/>
+              </a:endParaRPr>
+            </a:p>
+            <a:p>
+              <a:pPr algn="ctr"/>
+              <a:endParaRPr lang="en-US" dirty="0">
+                <a:latin typeface="Karbon Medium" panose="00000600000000000000" pitchFamily="50" charset="0"/>
+              </a:endParaRPr>
+            </a:p>
+            <a:p>
+              <a:pPr algn="ctr"/>
+              <a:r>
+                <a:rPr lang="en-US" dirty="0">
+                  <a:latin typeface="Karbon Medium" panose="00000600000000000000" pitchFamily="50" charset="0"/>
+                </a:rPr>
+                <a:t>Companion</a:t>
+              </a:r>
+            </a:p>
+          </p:txBody>
+        </p:sp>
+        <p:pic>
+          <p:nvPicPr>
+            <p:cNvPr id="28" name="Picture 27" descr="A logo with arrows and a red dot&#10;&#10;Description automatically generated">
+              <a:extLst>
+                <a:ext uri="{FF2B5EF4-FFF2-40B4-BE49-F238E27FC236}">
+                  <a16:creationId xmlns:a16="http://schemas.microsoft.com/office/drawing/2014/main" id="{697845DE-5101-86A7-1DBD-1E8C31C84037}"/>
+                </a:ext>
+              </a:extLst>
+            </p:cNvPr>
+            <p:cNvPicPr>
+              <a:picLocks noChangeAspect="1"/>
+            </p:cNvPicPr>
+            <p:nvPr/>
+          </p:nvPicPr>
+          <p:blipFill>
+            <a:blip r:embed="rId2">
+              <a:extLst>
+                <a:ext uri="{28A0092B-C50C-407E-A947-70E740481C1C}">
+                  <a14:useLocalDpi xmlns:a14="http://schemas.microsoft.com/office/drawing/2010/main" val="0"/>
+                </a:ext>
+              </a:extLst>
+            </a:blip>
+            <a:stretch>
+              <a:fillRect/>
+            </a:stretch>
+          </p:blipFill>
+          <p:spPr>
+            <a:xfrm>
+              <a:off x="1626542" y="2611679"/>
+              <a:ext cx="771240" cy="605682"/>
+            </a:xfrm>
+            <a:prstGeom prst="rect">
+              <a:avLst/>
+            </a:prstGeom>
+          </p:spPr>
+        </p:pic>
+      </p:grpSp>
+      <p:grpSp>
+        <p:nvGrpSpPr>
+          <p:cNvPr id="8" name="Group 7">
+            <a:extLst>
+              <a:ext uri="{FF2B5EF4-FFF2-40B4-BE49-F238E27FC236}">
+                <a16:creationId xmlns:a16="http://schemas.microsoft.com/office/drawing/2014/main" id="{05E37C53-B452-3D28-88CB-B0CB49176215}"/>
+              </a:ext>
+            </a:extLst>
+          </p:cNvPr>
+          <p:cNvGrpSpPr>
+            <a:grpSpLocks/>
+          </p:cNvGrpSpPr>
+          <p:nvPr/>
+        </p:nvGrpSpPr>
+        <p:grpSpPr>
+          <a:xfrm>
+            <a:off x="7470154" y="901314"/>
+            <a:ext cx="2146852" cy="2444757"/>
+            <a:chOff x="9042906" y="2206621"/>
+            <a:chExt cx="2146852" cy="2444757"/>
+          </a:xfrm>
+        </p:grpSpPr>
+        <p:sp>
+          <p:nvSpPr>
+            <p:cNvPr id="5" name="TextBox 4">
+              <a:extLst>
+                <a:ext uri="{FF2B5EF4-FFF2-40B4-BE49-F238E27FC236}">
+                  <a16:creationId xmlns:a16="http://schemas.microsoft.com/office/drawing/2014/main" id="{9589BD8C-56B9-5B7B-1FBA-041A9EE0C546}"/>
+                </a:ext>
+              </a:extLst>
+            </p:cNvPr>
+            <p:cNvSpPr txBox="1">
+              <a:spLocks/>
+            </p:cNvSpPr>
+            <p:nvPr/>
+          </p:nvSpPr>
+          <p:spPr>
+            <a:xfrm>
+              <a:off x="9042906" y="2206621"/>
+              <a:ext cx="2146852" cy="2444757"/>
+            </a:xfrm>
+            <a:prstGeom prst="roundRect">
+              <a:avLst/>
+            </a:prstGeom>
+            <a:solidFill>
+              <a:schemeClr val="bg2"/>
+            </a:solidFill>
+            <a:ln w="38100">
+              <a:solidFill>
+                <a:schemeClr val="bg2">
+                  <a:lumMod val="10000"/>
+                </a:schemeClr>
+              </a:solidFill>
+            </a:ln>
+          </p:spPr>
+          <p:txBody>
+            <a:bodyPr wrap="square" rtlCol="0" anchor="ctr" anchorCtr="0">
+              <a:noAutofit/>
+            </a:bodyPr>
+            <a:lstStyle/>
+            <a:p>
+              <a:pPr algn="ctr"/>
+              <a:endParaRPr lang="en-US" dirty="0">
+                <a:latin typeface="Karbon Medium" panose="00000600000000000000" pitchFamily="50" charset="0"/>
+              </a:endParaRPr>
+            </a:p>
+            <a:p>
+              <a:pPr algn="ctr"/>
+              <a:endParaRPr lang="en-US" dirty="0">
+                <a:latin typeface="Karbon Medium" panose="00000600000000000000" pitchFamily="50" charset="0"/>
+              </a:endParaRPr>
+            </a:p>
+            <a:p>
+              <a:pPr algn="ctr"/>
+              <a:endParaRPr lang="en-US" dirty="0">
+                <a:latin typeface="Karbon Medium" panose="00000600000000000000" pitchFamily="50" charset="0"/>
+              </a:endParaRPr>
+            </a:p>
+            <a:p>
+              <a:pPr algn="ctr"/>
+              <a:r>
+                <a:rPr lang="en-US" dirty="0">
+                  <a:latin typeface="Karbon Medium" panose="00000600000000000000" pitchFamily="50" charset="0"/>
+                </a:rPr>
+                <a:t>PowerPoint with </a:t>
+              </a:r>
+              <a:r>
+                <a:rPr lang="en-US" dirty="0" err="1">
+                  <a:latin typeface="Karbon Medium" panose="00000600000000000000" pitchFamily="50" charset="0"/>
+                </a:rPr>
+                <a:t>OSCPoint</a:t>
+              </a:r>
+              <a:r>
+                <a:rPr lang="en-US" dirty="0">
+                  <a:latin typeface="Karbon Medium" panose="00000600000000000000" pitchFamily="50" charset="0"/>
+                </a:rPr>
+                <a:t> add-in</a:t>
+              </a:r>
+            </a:p>
+          </p:txBody>
+        </p:sp>
+        <p:grpSp>
+          <p:nvGrpSpPr>
+            <p:cNvPr id="10" name="Group 9">
+              <a:extLst>
+                <a:ext uri="{FF2B5EF4-FFF2-40B4-BE49-F238E27FC236}">
+                  <a16:creationId xmlns:a16="http://schemas.microsoft.com/office/drawing/2014/main" id="{FA59D539-1669-0248-66E4-6C7316B82A66}"/>
+                </a:ext>
+              </a:extLst>
+            </p:cNvPr>
+            <p:cNvGrpSpPr>
+              <a:grpSpLocks/>
+            </p:cNvGrpSpPr>
+            <p:nvPr/>
+          </p:nvGrpSpPr>
+          <p:grpSpPr>
+            <a:xfrm>
+              <a:off x="9244481" y="2446385"/>
+              <a:ext cx="1716937" cy="818324"/>
+              <a:chOff x="8963470" y="1724692"/>
+              <a:chExt cx="1716937" cy="818324"/>
+            </a:xfrm>
+          </p:grpSpPr>
+          <p:pic>
+            <p:nvPicPr>
+              <p:cNvPr id="7" name="Picture 6" descr="A black red and white circle with black circles and a black background&#10;&#10;Description automatically generated">
+                <a:extLst>
+                  <a:ext uri="{FF2B5EF4-FFF2-40B4-BE49-F238E27FC236}">
+                    <a16:creationId xmlns:a16="http://schemas.microsoft.com/office/drawing/2014/main" id="{B4C459B3-78FE-AF2F-D70E-D4D45514123F}"/>
+                  </a:ext>
+                </a:extLst>
+              </p:cNvPr>
+              <p:cNvPicPr>
+                <a:picLocks noChangeAspect="1"/>
+              </p:cNvPicPr>
+              <p:nvPr/>
+            </p:nvPicPr>
+            <p:blipFill>
+              <a:blip r:embed="rId3">
+                <a:extLst>
+                  <a:ext uri="{28A0092B-C50C-407E-A947-70E740481C1C}">
+                    <a14:useLocalDpi xmlns:a14="http://schemas.microsoft.com/office/drawing/2010/main" val="0"/>
+                  </a:ext>
+                </a:extLst>
+              </a:blip>
+              <a:stretch>
+                <a:fillRect/>
+              </a:stretch>
+            </p:blipFill>
+            <p:spPr>
+              <a:xfrm>
+                <a:off x="8963470" y="1724692"/>
+                <a:ext cx="818324" cy="818324"/>
+              </a:xfrm>
+              <a:prstGeom prst="rect">
+                <a:avLst/>
+              </a:prstGeom>
+            </p:spPr>
+          </p:pic>
+          <p:pic>
+            <p:nvPicPr>
+              <p:cNvPr id="9" name="Picture 8" descr="A logo with a letter p">
+                <a:extLst>
+                  <a:ext uri="{FF2B5EF4-FFF2-40B4-BE49-F238E27FC236}">
+                    <a16:creationId xmlns:a16="http://schemas.microsoft.com/office/drawing/2014/main" id="{03825982-FE45-8A0E-CFA3-7483AE8945BA}"/>
+                  </a:ext>
+                </a:extLst>
+              </p:cNvPr>
+              <p:cNvPicPr>
+                <a:picLocks noChangeAspect="1"/>
+              </p:cNvPicPr>
+              <p:nvPr/>
+            </p:nvPicPr>
+            <p:blipFill>
+              <a:blip r:embed="rId4">
+                <a:extLst>
+                  <a:ext uri="{28A0092B-C50C-407E-A947-70E740481C1C}">
+                    <a14:useLocalDpi xmlns:a14="http://schemas.microsoft.com/office/drawing/2010/main" val="0"/>
+                  </a:ext>
+                </a:extLst>
+              </a:blip>
+              <a:stretch>
+                <a:fillRect/>
+              </a:stretch>
+            </p:blipFill>
+            <p:spPr>
+              <a:xfrm>
+                <a:off x="9862083" y="1724692"/>
+                <a:ext cx="818324" cy="818324"/>
+              </a:xfrm>
+              <a:prstGeom prst="rect">
+                <a:avLst/>
+              </a:prstGeom>
+            </p:spPr>
+          </p:pic>
+        </p:grpSp>
+      </p:grpSp>
+      <p:sp>
+        <p:nvSpPr>
+          <p:cNvPr id="19" name="TextBox 18">
+            <a:extLst>
+              <a:ext uri="{FF2B5EF4-FFF2-40B4-BE49-F238E27FC236}">
+                <a16:creationId xmlns:a16="http://schemas.microsoft.com/office/drawing/2014/main" id="{E08CCBA1-1E9B-11F9-96F9-2E8F7129E104}"/>
+              </a:ext>
+            </a:extLst>
+          </p:cNvPr>
+          <p:cNvSpPr txBox="1"/>
+          <p:nvPr/>
+        </p:nvSpPr>
+        <p:spPr>
+          <a:xfrm>
+            <a:off x="5451241" y="1610777"/>
+            <a:ext cx="742126" cy="276999"/>
+          </a:xfrm>
+          <a:prstGeom prst="rect">
+            <a:avLst/>
+          </a:prstGeom>
+          <a:noFill/>
+        </p:spPr>
+        <p:txBody>
+          <a:bodyPr wrap="none" rtlCol="0">
+            <a:spAutoFit/>
+          </a:bodyPr>
+          <a:lstStyle/>
+          <a:p>
+            <a:pPr algn="ctr"/>
+            <a:r>
+              <a:rPr lang="en-US" sz="1200" dirty="0">
+                <a:latin typeface="Karbon Medium" panose="00000600000000000000" pitchFamily="50" charset="0"/>
+              </a:rPr>
+              <a:t>ACTIONS</a:t>
+            </a:r>
+            <a:endParaRPr lang="en-GB" dirty="0">
+              <a:latin typeface="Karbon Medium" panose="00000600000000000000" pitchFamily="50" charset="0"/>
+            </a:endParaRPr>
+          </a:p>
+        </p:txBody>
+      </p:sp>
+      <p:sp>
+        <p:nvSpPr>
+          <p:cNvPr id="20" name="TextBox 19">
+            <a:extLst>
+              <a:ext uri="{FF2B5EF4-FFF2-40B4-BE49-F238E27FC236}">
+                <a16:creationId xmlns:a16="http://schemas.microsoft.com/office/drawing/2014/main" id="{9EB03160-A707-9D11-8CA2-FD26F7D76621}"/>
+              </a:ext>
+            </a:extLst>
+          </p:cNvPr>
+          <p:cNvSpPr txBox="1"/>
+          <p:nvPr/>
+        </p:nvSpPr>
+        <p:spPr>
+          <a:xfrm>
+            <a:off x="4235993" y="1132127"/>
+            <a:ext cx="1654940" cy="461665"/>
+          </a:xfrm>
+          <a:prstGeom prst="rect">
+            <a:avLst/>
+          </a:prstGeom>
+          <a:noFill/>
+        </p:spPr>
+        <p:txBody>
+          <a:bodyPr wrap="none" rtlCol="0">
+            <a:spAutoFit/>
+          </a:bodyPr>
+          <a:lstStyle/>
+          <a:p>
+            <a:r>
+              <a:rPr lang="en-US" sz="1200" dirty="0">
+                <a:latin typeface="Karbon Medium" panose="00000600000000000000" pitchFamily="50" charset="0"/>
+              </a:rPr>
+              <a:t>Remote host: </a:t>
+            </a:r>
+            <a:r>
+              <a:rPr lang="en-US" sz="1200" b="1" dirty="0">
+                <a:latin typeface="Karbon Medium" panose="00000600000000000000" pitchFamily="50" charset="0"/>
+              </a:rPr>
+              <a:t>127.0.0.1</a:t>
+            </a:r>
+          </a:p>
+          <a:p>
+            <a:r>
+              <a:rPr lang="en-US" sz="1200" dirty="0">
+                <a:latin typeface="Karbon Medium" panose="00000600000000000000" pitchFamily="50" charset="0"/>
+              </a:rPr>
+              <a:t>Remote port: </a:t>
+            </a:r>
+            <a:r>
+              <a:rPr lang="en-US" sz="1200" b="1" dirty="0">
+                <a:solidFill>
+                  <a:schemeClr val="accent5">
+                    <a:lumMod val="75000"/>
+                  </a:schemeClr>
+                </a:solidFill>
+                <a:latin typeface="Karbon Medium" panose="00000600000000000000" pitchFamily="50" charset="0"/>
+              </a:rPr>
+              <a:t>35551</a:t>
+            </a:r>
+            <a:endParaRPr lang="en-GB" sz="1200" b="1" dirty="0">
+              <a:solidFill>
+                <a:schemeClr val="accent5">
+                  <a:lumMod val="75000"/>
+                </a:schemeClr>
+              </a:solidFill>
+              <a:latin typeface="Karbon Medium" panose="00000600000000000000" pitchFamily="50" charset="0"/>
+            </a:endParaRPr>
+          </a:p>
+        </p:txBody>
+      </p:sp>
+      <p:sp>
+        <p:nvSpPr>
+          <p:cNvPr id="21" name="TextBox 20">
+            <a:extLst>
+              <a:ext uri="{FF2B5EF4-FFF2-40B4-BE49-F238E27FC236}">
+                <a16:creationId xmlns:a16="http://schemas.microsoft.com/office/drawing/2014/main" id="{1EEA0B57-42D2-8C56-5475-05E5BD053E96}"/>
+              </a:ext>
+            </a:extLst>
+          </p:cNvPr>
+          <p:cNvSpPr txBox="1"/>
+          <p:nvPr/>
+        </p:nvSpPr>
+        <p:spPr>
+          <a:xfrm>
+            <a:off x="6046152" y="1322614"/>
+            <a:ext cx="1275029" cy="276999"/>
+          </a:xfrm>
+          <a:prstGeom prst="rect">
+            <a:avLst/>
+          </a:prstGeom>
+          <a:noFill/>
+        </p:spPr>
+        <p:txBody>
+          <a:bodyPr wrap="none" rtlCol="0">
+            <a:spAutoFit/>
+          </a:bodyPr>
+          <a:lstStyle/>
+          <a:p>
+            <a:pPr algn="r"/>
+            <a:r>
+              <a:rPr lang="en-US" sz="1200" dirty="0">
+                <a:latin typeface="Karbon Medium" panose="00000600000000000000" pitchFamily="50" charset="0"/>
+              </a:rPr>
+              <a:t>Local port: </a:t>
+            </a:r>
+            <a:r>
+              <a:rPr lang="en-US" sz="1200" b="1" dirty="0">
+                <a:solidFill>
+                  <a:schemeClr val="accent5">
+                    <a:lumMod val="75000"/>
+                  </a:schemeClr>
+                </a:solidFill>
+                <a:latin typeface="Karbon Medium" panose="00000600000000000000" pitchFamily="50" charset="0"/>
+              </a:rPr>
+              <a:t>35551</a:t>
+            </a:r>
+            <a:endParaRPr lang="en-GB" sz="1200" b="1" dirty="0">
+              <a:solidFill>
+                <a:schemeClr val="accent5">
+                  <a:lumMod val="75000"/>
+                </a:schemeClr>
+              </a:solidFill>
+              <a:latin typeface="Karbon Medium" panose="00000600000000000000" pitchFamily="50" charset="0"/>
+            </a:endParaRPr>
+          </a:p>
+        </p:txBody>
+      </p:sp>
+      <p:sp>
+        <p:nvSpPr>
+          <p:cNvPr id="22" name="TextBox 21">
+            <a:extLst>
+              <a:ext uri="{FF2B5EF4-FFF2-40B4-BE49-F238E27FC236}">
+                <a16:creationId xmlns:a16="http://schemas.microsoft.com/office/drawing/2014/main" id="{1A517075-0C55-B206-1772-97D530EB59EA}"/>
+              </a:ext>
+            </a:extLst>
+          </p:cNvPr>
+          <p:cNvSpPr txBox="1"/>
+          <p:nvPr/>
+        </p:nvSpPr>
+        <p:spPr>
+          <a:xfrm>
+            <a:off x="5370383" y="2407476"/>
+            <a:ext cx="902042" cy="276999"/>
+          </a:xfrm>
+          <a:prstGeom prst="rect">
+            <a:avLst/>
+          </a:prstGeom>
+          <a:noFill/>
+        </p:spPr>
+        <p:txBody>
+          <a:bodyPr wrap="none" rtlCol="0">
+            <a:spAutoFit/>
+          </a:bodyPr>
+          <a:lstStyle/>
+          <a:p>
+            <a:pPr algn="ctr"/>
+            <a:r>
+              <a:rPr lang="en-US" sz="1200" dirty="0">
+                <a:latin typeface="Karbon Medium" panose="00000600000000000000" pitchFamily="50" charset="0"/>
+              </a:rPr>
+              <a:t>FEEDBACKS</a:t>
+            </a:r>
+            <a:endParaRPr lang="en-GB" dirty="0">
+              <a:latin typeface="Karbon Medium" panose="00000600000000000000" pitchFamily="50" charset="0"/>
+            </a:endParaRPr>
+          </a:p>
+        </p:txBody>
+      </p:sp>
+      <p:sp>
+        <p:nvSpPr>
+          <p:cNvPr id="23" name="TextBox 22">
+            <a:extLst>
+              <a:ext uri="{FF2B5EF4-FFF2-40B4-BE49-F238E27FC236}">
+                <a16:creationId xmlns:a16="http://schemas.microsoft.com/office/drawing/2014/main" id="{0D5B9A85-A7B1-A513-28D7-980BDC22FC6B}"/>
+              </a:ext>
+            </a:extLst>
+          </p:cNvPr>
+          <p:cNvSpPr txBox="1"/>
+          <p:nvPr/>
+        </p:nvSpPr>
+        <p:spPr>
+          <a:xfrm>
+            <a:off x="4235093" y="2109011"/>
+            <a:ext cx="1275029" cy="276999"/>
+          </a:xfrm>
+          <a:prstGeom prst="rect">
+            <a:avLst/>
+          </a:prstGeom>
+          <a:noFill/>
+        </p:spPr>
+        <p:txBody>
+          <a:bodyPr wrap="none" rtlCol="0">
+            <a:spAutoFit/>
+          </a:bodyPr>
+          <a:lstStyle/>
+          <a:p>
+            <a:r>
+              <a:rPr lang="en-US" sz="1200" dirty="0">
+                <a:latin typeface="Karbon Medium" panose="00000600000000000000" pitchFamily="50" charset="0"/>
+              </a:rPr>
+              <a:t>Local port: </a:t>
+            </a:r>
+            <a:r>
+              <a:rPr lang="en-US" sz="1200" b="1" dirty="0">
+                <a:solidFill>
+                  <a:schemeClr val="accent6">
+                    <a:lumMod val="75000"/>
+                  </a:schemeClr>
+                </a:solidFill>
+                <a:latin typeface="Karbon Medium" panose="00000600000000000000" pitchFamily="50" charset="0"/>
+              </a:rPr>
+              <a:t>35550</a:t>
+            </a:r>
+            <a:endParaRPr lang="en-GB" sz="1200" b="1" dirty="0">
+              <a:solidFill>
+                <a:schemeClr val="accent6">
+                  <a:lumMod val="75000"/>
+                </a:schemeClr>
+              </a:solidFill>
+              <a:latin typeface="Karbon Medium" panose="00000600000000000000" pitchFamily="50" charset="0"/>
+            </a:endParaRPr>
+          </a:p>
+        </p:txBody>
+      </p:sp>
+      <p:sp>
+        <p:nvSpPr>
+          <p:cNvPr id="24" name="TextBox 23">
+            <a:extLst>
+              <a:ext uri="{FF2B5EF4-FFF2-40B4-BE49-F238E27FC236}">
+                <a16:creationId xmlns:a16="http://schemas.microsoft.com/office/drawing/2014/main" id="{B06942BC-503E-1286-2863-EF6A76F5037A}"/>
+              </a:ext>
+            </a:extLst>
+          </p:cNvPr>
+          <p:cNvSpPr txBox="1"/>
+          <p:nvPr/>
+        </p:nvSpPr>
+        <p:spPr>
+          <a:xfrm>
+            <a:off x="5665340" y="1918374"/>
+            <a:ext cx="1654941" cy="461665"/>
+          </a:xfrm>
+          <a:prstGeom prst="rect">
+            <a:avLst/>
+          </a:prstGeom>
+          <a:noFill/>
+        </p:spPr>
+        <p:txBody>
+          <a:bodyPr wrap="none" rtlCol="0">
+            <a:spAutoFit/>
+          </a:bodyPr>
+          <a:lstStyle/>
+          <a:p>
+            <a:pPr algn="r"/>
+            <a:r>
+              <a:rPr lang="en-US" sz="1200" dirty="0">
+                <a:latin typeface="Karbon Medium" panose="00000600000000000000" pitchFamily="50" charset="0"/>
+              </a:rPr>
+              <a:t>Remote host: </a:t>
+            </a:r>
+            <a:r>
+              <a:rPr lang="en-US" sz="1200" b="1" dirty="0">
+                <a:latin typeface="Karbon Medium" panose="00000600000000000000" pitchFamily="50" charset="0"/>
+              </a:rPr>
+              <a:t>127.0.0.1</a:t>
+            </a:r>
+          </a:p>
+          <a:p>
+            <a:pPr algn="r"/>
+            <a:r>
+              <a:rPr lang="en-US" sz="1200" dirty="0">
+                <a:latin typeface="Karbon Medium" panose="00000600000000000000" pitchFamily="50" charset="0"/>
+              </a:rPr>
+              <a:t>Remote Port: </a:t>
+            </a:r>
+            <a:r>
+              <a:rPr lang="en-US" sz="1200" b="1" dirty="0">
+                <a:solidFill>
+                  <a:schemeClr val="accent6">
+                    <a:lumMod val="75000"/>
+                  </a:schemeClr>
+                </a:solidFill>
+                <a:latin typeface="Karbon Medium" panose="00000600000000000000" pitchFamily="50" charset="0"/>
+              </a:rPr>
+              <a:t>35550</a:t>
+            </a:r>
+            <a:endParaRPr lang="en-GB" sz="1200" b="1" dirty="0">
+              <a:solidFill>
+                <a:schemeClr val="accent6">
+                  <a:lumMod val="75000"/>
+                </a:schemeClr>
+              </a:solidFill>
+              <a:latin typeface="Karbon Medium" panose="00000600000000000000" pitchFamily="50" charset="0"/>
+            </a:endParaRPr>
+          </a:p>
+        </p:txBody>
+      </p:sp>
+      <p:cxnSp>
+        <p:nvCxnSpPr>
+          <p:cNvPr id="13" name="Straight Arrow Connector 12">
+            <a:extLst>
+              <a:ext uri="{FF2B5EF4-FFF2-40B4-BE49-F238E27FC236}">
+                <a16:creationId xmlns:a16="http://schemas.microsoft.com/office/drawing/2014/main" id="{26121B7B-6163-4FC4-CAAD-7218EBF0F487}"/>
+              </a:ext>
+            </a:extLst>
+          </p:cNvPr>
+          <p:cNvCxnSpPr>
+            <a:cxnSpLocks/>
+          </p:cNvCxnSpPr>
+          <p:nvPr/>
+        </p:nvCxnSpPr>
+        <p:spPr>
+          <a:xfrm>
+            <a:off x="4152537" y="1638509"/>
+            <a:ext cx="3246783" cy="0"/>
+          </a:xfrm>
+          <a:prstGeom prst="straightConnector1">
+            <a:avLst/>
+          </a:prstGeom>
+          <a:ln w="57150">
+            <a:tailEnd type="triangle"/>
+          </a:ln>
+        </p:spPr>
+        <p:style>
+          <a:lnRef idx="2">
+            <a:schemeClr val="accent1"/>
+          </a:lnRef>
+          <a:fillRef idx="0">
+            <a:schemeClr val="accent1"/>
+          </a:fillRef>
+          <a:effectRef idx="1">
+            <a:schemeClr val="accent1"/>
+          </a:effectRef>
+          <a:fontRef idx="minor">
+            <a:schemeClr val="tx1"/>
+          </a:fontRef>
+        </p:style>
+      </p:cxnSp>
+      <p:cxnSp>
+        <p:nvCxnSpPr>
+          <p:cNvPr id="14" name="Straight Arrow Connector 13">
+            <a:extLst>
+              <a:ext uri="{FF2B5EF4-FFF2-40B4-BE49-F238E27FC236}">
+                <a16:creationId xmlns:a16="http://schemas.microsoft.com/office/drawing/2014/main" id="{B30AC69D-26EE-26A5-94E4-A6BC1D62650A}"/>
+              </a:ext>
+            </a:extLst>
+          </p:cNvPr>
+          <p:cNvCxnSpPr>
+            <a:cxnSpLocks/>
+          </p:cNvCxnSpPr>
+          <p:nvPr/>
+        </p:nvCxnSpPr>
+        <p:spPr>
+          <a:xfrm>
+            <a:off x="4151637" y="2431724"/>
+            <a:ext cx="3246783" cy="0"/>
+          </a:xfrm>
+          <a:prstGeom prst="straightConnector1">
+            <a:avLst/>
+          </a:prstGeom>
+          <a:ln w="57150">
+            <a:solidFill>
+              <a:schemeClr val="accent2"/>
+            </a:solidFill>
+            <a:headEnd type="triangle"/>
+            <a:tailEnd type="none"/>
+          </a:ln>
+        </p:spPr>
+        <p:style>
+          <a:lnRef idx="2">
+            <a:schemeClr val="accent1"/>
+          </a:lnRef>
+          <a:fillRef idx="0">
+            <a:schemeClr val="accent1"/>
+          </a:fillRef>
+          <a:effectRef idx="1">
+            <a:schemeClr val="accent1"/>
+          </a:effectRef>
+          <a:fontRef idx="minor">
+            <a:schemeClr val="tx1"/>
+          </a:fontRef>
+        </p:style>
+      </p:cxnSp>
+      <p:sp>
+        <p:nvSpPr>
+          <p:cNvPr id="29" name="TextBox 28">
+            <a:extLst>
+              <a:ext uri="{FF2B5EF4-FFF2-40B4-BE49-F238E27FC236}">
+                <a16:creationId xmlns:a16="http://schemas.microsoft.com/office/drawing/2014/main" id="{C3A265CE-F499-37FC-7655-4B0AE3980C20}"/>
+              </a:ext>
+            </a:extLst>
+          </p:cNvPr>
+          <p:cNvSpPr txBox="1"/>
+          <p:nvPr/>
+        </p:nvSpPr>
+        <p:spPr>
+          <a:xfrm>
+            <a:off x="3017520" y="349149"/>
+            <a:ext cx="5472533" cy="584775"/>
+          </a:xfrm>
+          <a:prstGeom prst="rect">
+            <a:avLst/>
+          </a:prstGeom>
+          <a:noFill/>
+        </p:spPr>
+        <p:txBody>
+          <a:bodyPr wrap="square" rtlCol="0">
+            <a:spAutoFit/>
+          </a:bodyPr>
+          <a:lstStyle/>
+          <a:p>
+            <a:pPr algn="ctr"/>
+            <a:r>
+              <a:rPr lang="en-US" sz="1600" dirty="0">
+                <a:latin typeface="Karbon Medium" panose="00000600000000000000" pitchFamily="50" charset="0"/>
+              </a:rPr>
+              <a:t>MACHINE ONE – COMPANION, PPT &amp; OSCPOINT</a:t>
+            </a:r>
+          </a:p>
+          <a:p>
+            <a:pPr algn="ctr"/>
+            <a:r>
+              <a:rPr lang="en-US" sz="1600" dirty="0">
+                <a:latin typeface="Karbon Medium" panose="00000600000000000000" pitchFamily="50" charset="0"/>
+              </a:rPr>
+              <a:t>IP: </a:t>
+            </a:r>
+            <a:r>
+              <a:rPr lang="en-US" sz="1600" dirty="0">
+                <a:solidFill>
+                  <a:schemeClr val="accent6">
+                    <a:lumMod val="75000"/>
+                  </a:schemeClr>
+                </a:solidFill>
+                <a:latin typeface="Karbon Medium" panose="00000600000000000000" pitchFamily="50" charset="0"/>
+              </a:rPr>
+              <a:t>192.168.0.11</a:t>
+            </a:r>
+            <a:endParaRPr lang="en-GB" sz="1600" dirty="0">
+              <a:solidFill>
+                <a:schemeClr val="accent6">
+                  <a:lumMod val="75000"/>
+                </a:schemeClr>
+              </a:solidFill>
+              <a:latin typeface="Karbon Medium" panose="00000600000000000000" pitchFamily="50" charset="0"/>
+            </a:endParaRPr>
+          </a:p>
+        </p:txBody>
+      </p:sp>
+      <p:grpSp>
+        <p:nvGrpSpPr>
+          <p:cNvPr id="3" name="Group 2">
+            <a:extLst>
+              <a:ext uri="{FF2B5EF4-FFF2-40B4-BE49-F238E27FC236}">
+                <a16:creationId xmlns:a16="http://schemas.microsoft.com/office/drawing/2014/main" id="{37E28FC9-556E-BA21-6A3F-2A0B6F3ACFFB}"/>
+              </a:ext>
+            </a:extLst>
+          </p:cNvPr>
+          <p:cNvGrpSpPr/>
+          <p:nvPr/>
+        </p:nvGrpSpPr>
+        <p:grpSpPr>
+          <a:xfrm>
+            <a:off x="7470154" y="4233026"/>
+            <a:ext cx="2146852" cy="2444757"/>
+            <a:chOff x="8761895" y="1413564"/>
+            <a:chExt cx="2146852" cy="2444757"/>
+          </a:xfrm>
+        </p:grpSpPr>
+        <p:sp>
+          <p:nvSpPr>
+            <p:cNvPr id="11" name="TextBox 10">
+              <a:extLst>
+                <a:ext uri="{FF2B5EF4-FFF2-40B4-BE49-F238E27FC236}">
+                  <a16:creationId xmlns:a16="http://schemas.microsoft.com/office/drawing/2014/main" id="{FF34D702-C3B5-401C-8A61-6355C14F5EF4}"/>
+                </a:ext>
+              </a:extLst>
+            </p:cNvPr>
+            <p:cNvSpPr txBox="1"/>
+            <p:nvPr/>
+          </p:nvSpPr>
+          <p:spPr>
+            <a:xfrm>
+              <a:off x="8761895" y="1413564"/>
+              <a:ext cx="2146852" cy="2444757"/>
+            </a:xfrm>
+            <a:prstGeom prst="roundRect">
+              <a:avLst/>
+            </a:prstGeom>
+            <a:solidFill>
+              <a:schemeClr val="bg2"/>
+            </a:solidFill>
+            <a:ln w="38100">
+              <a:solidFill>
+                <a:schemeClr val="bg2">
+                  <a:lumMod val="10000"/>
+                </a:schemeClr>
+              </a:solidFill>
+            </a:ln>
+          </p:spPr>
+          <p:txBody>
+            <a:bodyPr wrap="square" rtlCol="0" anchor="ctr" anchorCtr="0">
+              <a:noAutofit/>
+            </a:bodyPr>
+            <a:lstStyle/>
+            <a:p>
+              <a:pPr algn="ctr"/>
+              <a:endParaRPr lang="en-US" dirty="0">
+                <a:latin typeface="Karbon Medium" panose="00000600000000000000" pitchFamily="50" charset="0"/>
+              </a:endParaRPr>
+            </a:p>
+            <a:p>
+              <a:pPr algn="ctr"/>
+              <a:endParaRPr lang="en-US" dirty="0">
+                <a:latin typeface="Karbon Medium" panose="00000600000000000000" pitchFamily="50" charset="0"/>
+              </a:endParaRPr>
+            </a:p>
+            <a:p>
+              <a:pPr algn="ctr"/>
+              <a:endParaRPr lang="en-US" dirty="0">
+                <a:latin typeface="Karbon Medium" panose="00000600000000000000" pitchFamily="50" charset="0"/>
+              </a:endParaRPr>
+            </a:p>
+            <a:p>
+              <a:pPr algn="ctr"/>
+              <a:r>
+                <a:rPr lang="en-US" dirty="0">
+                  <a:latin typeface="Karbon Medium" panose="00000600000000000000" pitchFamily="50" charset="0"/>
+                </a:rPr>
+                <a:t>PowerPoint machine #2 with </a:t>
+              </a:r>
+              <a:r>
+                <a:rPr lang="en-US" dirty="0" err="1">
+                  <a:latin typeface="Karbon Medium" panose="00000600000000000000" pitchFamily="50" charset="0"/>
+                </a:rPr>
+                <a:t>OSCPoint</a:t>
+              </a:r>
+              <a:r>
+                <a:rPr lang="en-US" dirty="0">
+                  <a:latin typeface="Karbon Medium" panose="00000600000000000000" pitchFamily="50" charset="0"/>
+                </a:rPr>
+                <a:t> add-in</a:t>
+              </a:r>
+            </a:p>
+            <a:p>
+              <a:pPr algn="ctr"/>
+              <a:r>
+                <a:rPr lang="en-US" dirty="0">
+                  <a:latin typeface="Karbon Medium" panose="00000600000000000000" pitchFamily="50" charset="0"/>
+                </a:rPr>
+                <a:t>IP: </a:t>
+              </a:r>
+              <a:r>
+                <a:rPr lang="en-US" b="1" dirty="0">
+                  <a:solidFill>
+                    <a:schemeClr val="accent5">
+                      <a:lumMod val="75000"/>
+                    </a:schemeClr>
+                  </a:solidFill>
+                  <a:latin typeface="Karbon Medium" panose="00000600000000000000" pitchFamily="50" charset="0"/>
+                </a:rPr>
+                <a:t>192.168.0.21</a:t>
+              </a:r>
+              <a:endParaRPr lang="en-GB" b="1" dirty="0">
+                <a:solidFill>
+                  <a:schemeClr val="accent5">
+                    <a:lumMod val="75000"/>
+                  </a:schemeClr>
+                </a:solidFill>
+                <a:latin typeface="Karbon Medium" panose="00000600000000000000" pitchFamily="50" charset="0"/>
+              </a:endParaRPr>
+            </a:p>
+          </p:txBody>
+        </p:sp>
+        <p:grpSp>
+          <p:nvGrpSpPr>
+            <p:cNvPr id="12" name="Group 11">
+              <a:extLst>
+                <a:ext uri="{FF2B5EF4-FFF2-40B4-BE49-F238E27FC236}">
+                  <a16:creationId xmlns:a16="http://schemas.microsoft.com/office/drawing/2014/main" id="{7732BD33-ED06-28A3-272B-2C9C6A1C29FD}"/>
+                </a:ext>
+              </a:extLst>
+            </p:cNvPr>
+            <p:cNvGrpSpPr/>
+            <p:nvPr/>
+          </p:nvGrpSpPr>
+          <p:grpSpPr>
+            <a:xfrm>
+              <a:off x="8963470" y="1653328"/>
+              <a:ext cx="1716937" cy="818324"/>
+              <a:chOff x="8963470" y="1724692"/>
+              <a:chExt cx="1716937" cy="818324"/>
+            </a:xfrm>
+          </p:grpSpPr>
+          <p:pic>
+            <p:nvPicPr>
+              <p:cNvPr id="15" name="Picture 14" descr="A black red and white circle with black circles and a black background&#10;&#10;Description automatically generated">
+                <a:extLst>
+                  <a:ext uri="{FF2B5EF4-FFF2-40B4-BE49-F238E27FC236}">
+                    <a16:creationId xmlns:a16="http://schemas.microsoft.com/office/drawing/2014/main" id="{51DC2A43-4174-AFBD-AE3E-564A71CD7102}"/>
+                  </a:ext>
+                </a:extLst>
+              </p:cNvPr>
+              <p:cNvPicPr>
+                <a:picLocks noChangeAspect="1"/>
+              </p:cNvPicPr>
+              <p:nvPr/>
+            </p:nvPicPr>
+            <p:blipFill>
+              <a:blip r:embed="rId3">
+                <a:extLst>
+                  <a:ext uri="{28A0092B-C50C-407E-A947-70E740481C1C}">
+                    <a14:useLocalDpi xmlns:a14="http://schemas.microsoft.com/office/drawing/2010/main" val="0"/>
+                  </a:ext>
+                </a:extLst>
+              </a:blip>
+              <a:stretch>
+                <a:fillRect/>
+              </a:stretch>
+            </p:blipFill>
+            <p:spPr>
+              <a:xfrm>
+                <a:off x="8963470" y="1724692"/>
+                <a:ext cx="818324" cy="818324"/>
+              </a:xfrm>
+              <a:prstGeom prst="rect">
+                <a:avLst/>
+              </a:prstGeom>
+            </p:spPr>
+          </p:pic>
+          <p:pic>
+            <p:nvPicPr>
+              <p:cNvPr id="16" name="Picture 15" descr="A logo with a letter p">
+                <a:extLst>
+                  <a:ext uri="{FF2B5EF4-FFF2-40B4-BE49-F238E27FC236}">
+                    <a16:creationId xmlns:a16="http://schemas.microsoft.com/office/drawing/2014/main" id="{ECD40718-8225-6E94-0DF3-7BE1624F3FB0}"/>
+                  </a:ext>
+                </a:extLst>
+              </p:cNvPr>
+              <p:cNvPicPr>
+                <a:picLocks noChangeAspect="1"/>
+              </p:cNvPicPr>
+              <p:nvPr/>
+            </p:nvPicPr>
+            <p:blipFill>
+              <a:blip r:embed="rId4">
+                <a:extLst>
+                  <a:ext uri="{28A0092B-C50C-407E-A947-70E740481C1C}">
+                    <a14:useLocalDpi xmlns:a14="http://schemas.microsoft.com/office/drawing/2010/main" val="0"/>
+                  </a:ext>
+                </a:extLst>
+              </a:blip>
+              <a:stretch>
+                <a:fillRect/>
+              </a:stretch>
+            </p:blipFill>
+            <p:spPr>
+              <a:xfrm>
+                <a:off x="9862083" y="1724692"/>
+                <a:ext cx="818324" cy="818324"/>
+              </a:xfrm>
+              <a:prstGeom prst="rect">
+                <a:avLst/>
+              </a:prstGeom>
+            </p:spPr>
+          </p:pic>
+        </p:grpSp>
+      </p:grpSp>
+      <p:sp>
+        <p:nvSpPr>
+          <p:cNvPr id="25" name="TextBox 24">
+            <a:extLst>
+              <a:ext uri="{FF2B5EF4-FFF2-40B4-BE49-F238E27FC236}">
+                <a16:creationId xmlns:a16="http://schemas.microsoft.com/office/drawing/2014/main" id="{3668C61D-BE6D-5495-FBAC-22BBFFD2679A}"/>
+              </a:ext>
+            </a:extLst>
+          </p:cNvPr>
+          <p:cNvSpPr txBox="1"/>
+          <p:nvPr/>
+        </p:nvSpPr>
+        <p:spPr>
+          <a:xfrm>
+            <a:off x="5817655" y="4242673"/>
+            <a:ext cx="751423" cy="276999"/>
+          </a:xfrm>
+          <a:prstGeom prst="rect">
+            <a:avLst/>
+          </a:prstGeom>
+          <a:noFill/>
+        </p:spPr>
+        <p:txBody>
+          <a:bodyPr wrap="none" rtlCol="0">
+            <a:spAutoFit/>
+          </a:bodyPr>
+          <a:lstStyle/>
+          <a:p>
+            <a:pPr algn="ctr"/>
+            <a:r>
+              <a:rPr lang="en-US" sz="1200" dirty="0">
+                <a:latin typeface="Karbon Medium" panose="00000600000000000000" pitchFamily="50" charset="0"/>
+              </a:rPr>
+              <a:t>ACTIONS</a:t>
+            </a:r>
+            <a:endParaRPr lang="en-GB" sz="1200" dirty="0">
+              <a:latin typeface="Karbon Medium" panose="00000600000000000000" pitchFamily="50" charset="0"/>
+            </a:endParaRPr>
+          </a:p>
+        </p:txBody>
+      </p:sp>
+      <p:sp>
+        <p:nvSpPr>
+          <p:cNvPr id="26" name="TextBox 25">
+            <a:extLst>
+              <a:ext uri="{FF2B5EF4-FFF2-40B4-BE49-F238E27FC236}">
+                <a16:creationId xmlns:a16="http://schemas.microsoft.com/office/drawing/2014/main" id="{C3890B15-65A4-809B-79D9-90DE8860AA25}"/>
+              </a:ext>
+            </a:extLst>
+          </p:cNvPr>
+          <p:cNvSpPr txBox="1"/>
+          <p:nvPr/>
+        </p:nvSpPr>
+        <p:spPr>
+          <a:xfrm>
+            <a:off x="5784018" y="3517996"/>
+            <a:ext cx="1600118" cy="430887"/>
+          </a:xfrm>
+          <a:prstGeom prst="rect">
+            <a:avLst/>
+          </a:prstGeom>
+          <a:noFill/>
+        </p:spPr>
+        <p:txBody>
+          <a:bodyPr wrap="none" rtlCol="0">
+            <a:spAutoFit/>
+          </a:bodyPr>
+          <a:lstStyle/>
+          <a:p>
+            <a:r>
+              <a:rPr lang="en-US" sz="1100" dirty="0">
+                <a:latin typeface="Karbon Medium" panose="00000600000000000000" pitchFamily="50" charset="0"/>
+              </a:rPr>
+              <a:t>Remote host: </a:t>
+            </a:r>
+            <a:r>
+              <a:rPr lang="en-US" sz="1100" b="1" dirty="0">
+                <a:solidFill>
+                  <a:schemeClr val="accent5">
+                    <a:lumMod val="75000"/>
+                  </a:schemeClr>
+                </a:solidFill>
+                <a:latin typeface="Karbon Medium" panose="00000600000000000000" pitchFamily="50" charset="0"/>
+              </a:rPr>
+              <a:t>192.168.0.21</a:t>
+            </a:r>
+          </a:p>
+          <a:p>
+            <a:r>
+              <a:rPr lang="en-US" sz="1100" dirty="0">
+                <a:latin typeface="Karbon Medium" panose="00000600000000000000" pitchFamily="50" charset="0"/>
+              </a:rPr>
+              <a:t>Remote port: </a:t>
+            </a:r>
+            <a:r>
+              <a:rPr lang="en-US" sz="1100" b="1" dirty="0">
+                <a:solidFill>
+                  <a:schemeClr val="accent5">
+                    <a:lumMod val="75000"/>
+                  </a:schemeClr>
+                </a:solidFill>
+                <a:latin typeface="Karbon Medium" panose="00000600000000000000" pitchFamily="50" charset="0"/>
+              </a:rPr>
+              <a:t>35551</a:t>
+            </a:r>
+            <a:endParaRPr lang="en-GB" sz="1100" b="1" dirty="0">
+              <a:solidFill>
+                <a:schemeClr val="accent5">
+                  <a:lumMod val="75000"/>
+                </a:schemeClr>
+              </a:solidFill>
+              <a:latin typeface="Karbon Medium" panose="00000600000000000000" pitchFamily="50" charset="0"/>
+            </a:endParaRPr>
+          </a:p>
+        </p:txBody>
+      </p:sp>
+      <p:sp>
+        <p:nvSpPr>
+          <p:cNvPr id="27" name="TextBox 26">
+            <a:extLst>
+              <a:ext uri="{FF2B5EF4-FFF2-40B4-BE49-F238E27FC236}">
+                <a16:creationId xmlns:a16="http://schemas.microsoft.com/office/drawing/2014/main" id="{33BB54B5-359E-4438-7DE7-404A9F9E908D}"/>
+              </a:ext>
+            </a:extLst>
+          </p:cNvPr>
+          <p:cNvSpPr txBox="1"/>
+          <p:nvPr/>
+        </p:nvSpPr>
+        <p:spPr>
+          <a:xfrm>
+            <a:off x="6012972" y="4602043"/>
+            <a:ext cx="1275029" cy="276999"/>
+          </a:xfrm>
+          <a:prstGeom prst="rect">
+            <a:avLst/>
+          </a:prstGeom>
+          <a:noFill/>
+        </p:spPr>
+        <p:txBody>
+          <a:bodyPr wrap="none" rtlCol="0">
+            <a:spAutoFit/>
+          </a:bodyPr>
+          <a:lstStyle/>
+          <a:p>
+            <a:pPr algn="r"/>
+            <a:r>
+              <a:rPr lang="en-US" sz="1200" dirty="0">
+                <a:latin typeface="Karbon Medium" panose="00000600000000000000" pitchFamily="50" charset="0"/>
+              </a:rPr>
+              <a:t>Local port: </a:t>
+            </a:r>
+            <a:r>
+              <a:rPr lang="en-US" sz="1200" b="1" dirty="0">
+                <a:solidFill>
+                  <a:schemeClr val="accent5">
+                    <a:lumMod val="75000"/>
+                  </a:schemeClr>
+                </a:solidFill>
+                <a:latin typeface="Karbon Medium" panose="00000600000000000000" pitchFamily="50" charset="0"/>
+              </a:rPr>
+              <a:t>35551</a:t>
+            </a:r>
+            <a:endParaRPr lang="en-GB" sz="1200" b="1" dirty="0">
+              <a:solidFill>
+                <a:schemeClr val="accent5">
+                  <a:lumMod val="75000"/>
+                </a:schemeClr>
+              </a:solidFill>
+              <a:latin typeface="Karbon Medium" panose="00000600000000000000" pitchFamily="50" charset="0"/>
+            </a:endParaRPr>
+          </a:p>
+        </p:txBody>
+      </p:sp>
+      <p:sp>
+        <p:nvSpPr>
+          <p:cNvPr id="30" name="TextBox 29">
+            <a:extLst>
+              <a:ext uri="{FF2B5EF4-FFF2-40B4-BE49-F238E27FC236}">
+                <a16:creationId xmlns:a16="http://schemas.microsoft.com/office/drawing/2014/main" id="{CE2165DF-CD5A-8AD7-B6F7-468B9A164748}"/>
+              </a:ext>
+            </a:extLst>
+          </p:cNvPr>
+          <p:cNvSpPr txBox="1"/>
+          <p:nvPr/>
+        </p:nvSpPr>
+        <p:spPr>
+          <a:xfrm>
+            <a:off x="4361024" y="4225766"/>
+            <a:ext cx="1023165" cy="307777"/>
+          </a:xfrm>
+          <a:prstGeom prst="rect">
+            <a:avLst/>
+          </a:prstGeom>
+          <a:noFill/>
+        </p:spPr>
+        <p:txBody>
+          <a:bodyPr wrap="none" rtlCol="0">
+            <a:spAutoFit/>
+          </a:bodyPr>
+          <a:lstStyle/>
+          <a:p>
+            <a:pPr algn="ctr"/>
+            <a:r>
+              <a:rPr lang="en-US" sz="1400" dirty="0">
+                <a:latin typeface="Karbon Medium" panose="00000600000000000000" pitchFamily="50" charset="0"/>
+              </a:rPr>
+              <a:t>FEEDBACKS</a:t>
+            </a:r>
+            <a:endParaRPr lang="en-GB" sz="1400" dirty="0">
+              <a:latin typeface="Karbon Medium" panose="00000600000000000000" pitchFamily="50" charset="0"/>
+            </a:endParaRPr>
+          </a:p>
+        </p:txBody>
+      </p:sp>
+      <p:sp>
+        <p:nvSpPr>
+          <p:cNvPr id="31" name="TextBox 30">
+            <a:extLst>
+              <a:ext uri="{FF2B5EF4-FFF2-40B4-BE49-F238E27FC236}">
+                <a16:creationId xmlns:a16="http://schemas.microsoft.com/office/drawing/2014/main" id="{D22109D1-3A20-10B0-D37E-DB7DE751A094}"/>
+              </a:ext>
+            </a:extLst>
+          </p:cNvPr>
+          <p:cNvSpPr txBox="1"/>
+          <p:nvPr/>
+        </p:nvSpPr>
+        <p:spPr>
+          <a:xfrm>
+            <a:off x="4242322" y="3346071"/>
+            <a:ext cx="1088760" cy="261610"/>
+          </a:xfrm>
+          <a:prstGeom prst="rect">
+            <a:avLst/>
+          </a:prstGeom>
+          <a:noFill/>
+        </p:spPr>
+        <p:txBody>
+          <a:bodyPr wrap="none" rtlCol="0">
+            <a:spAutoFit/>
+          </a:bodyPr>
+          <a:lstStyle/>
+          <a:p>
+            <a:r>
+              <a:rPr lang="en-US" sz="1100" dirty="0">
+                <a:latin typeface="Karbon Medium" panose="00000600000000000000" pitchFamily="50" charset="0"/>
+              </a:rPr>
+              <a:t>Local port: </a:t>
+            </a:r>
+            <a:r>
+              <a:rPr lang="en-US" sz="1100" b="1" dirty="0">
+                <a:solidFill>
+                  <a:schemeClr val="accent6">
+                    <a:lumMod val="75000"/>
+                  </a:schemeClr>
+                </a:solidFill>
+                <a:latin typeface="Karbon Medium" panose="00000600000000000000" pitchFamily="50" charset="0"/>
+              </a:rPr>
+              <a:t>35551</a:t>
+            </a:r>
+            <a:endParaRPr lang="en-GB" sz="1100" b="1" dirty="0">
+              <a:solidFill>
+                <a:schemeClr val="accent6">
+                  <a:lumMod val="75000"/>
+                </a:schemeClr>
+              </a:solidFill>
+              <a:latin typeface="Karbon Medium" panose="00000600000000000000" pitchFamily="50" charset="0"/>
+            </a:endParaRPr>
+          </a:p>
+        </p:txBody>
+      </p:sp>
+      <p:sp>
+        <p:nvSpPr>
+          <p:cNvPr id="32" name="TextBox 31">
+            <a:extLst>
+              <a:ext uri="{FF2B5EF4-FFF2-40B4-BE49-F238E27FC236}">
+                <a16:creationId xmlns:a16="http://schemas.microsoft.com/office/drawing/2014/main" id="{936A59F6-144C-4F77-E6B2-CF8367A172A0}"/>
+              </a:ext>
+            </a:extLst>
+          </p:cNvPr>
+          <p:cNvSpPr txBox="1"/>
+          <p:nvPr/>
+        </p:nvSpPr>
+        <p:spPr>
+          <a:xfrm>
+            <a:off x="5596641" y="5562722"/>
+            <a:ext cx="1691360" cy="461665"/>
+          </a:xfrm>
+          <a:prstGeom prst="rect">
+            <a:avLst/>
+          </a:prstGeom>
+          <a:noFill/>
+        </p:spPr>
+        <p:txBody>
+          <a:bodyPr wrap="none" rtlCol="0">
+            <a:spAutoFit/>
+          </a:bodyPr>
+          <a:lstStyle/>
+          <a:p>
+            <a:pPr algn="r"/>
+            <a:r>
+              <a:rPr lang="en-US" sz="1200" dirty="0">
+                <a:latin typeface="Karbon Medium" panose="00000600000000000000" pitchFamily="50" charset="0"/>
+              </a:rPr>
+              <a:t>Remote host: </a:t>
+            </a:r>
+            <a:r>
+              <a:rPr lang="en-US" sz="1200" b="1" dirty="0">
+                <a:solidFill>
+                  <a:schemeClr val="accent6">
+                    <a:lumMod val="75000"/>
+                  </a:schemeClr>
+                </a:solidFill>
+                <a:latin typeface="Karbon Medium" panose="00000600000000000000" pitchFamily="50" charset="0"/>
+              </a:rPr>
+              <a:t>192.168.0.11</a:t>
+            </a:r>
+          </a:p>
+          <a:p>
+            <a:pPr algn="r"/>
+            <a:r>
+              <a:rPr lang="en-US" sz="1200" dirty="0">
+                <a:latin typeface="Karbon Medium" panose="00000600000000000000" pitchFamily="50" charset="0"/>
+              </a:rPr>
+              <a:t>Remote Port: </a:t>
+            </a:r>
+            <a:r>
+              <a:rPr lang="en-US" sz="1200" b="1" dirty="0">
+                <a:solidFill>
+                  <a:schemeClr val="accent6">
+                    <a:lumMod val="75000"/>
+                  </a:schemeClr>
+                </a:solidFill>
+                <a:latin typeface="Karbon Medium" panose="00000600000000000000" pitchFamily="50" charset="0"/>
+              </a:rPr>
+              <a:t>35551</a:t>
+            </a:r>
+            <a:endParaRPr lang="en-GB" sz="1200" b="1" dirty="0">
+              <a:solidFill>
+                <a:schemeClr val="accent6">
+                  <a:lumMod val="75000"/>
+                </a:schemeClr>
+              </a:solidFill>
+              <a:latin typeface="Karbon Medium" panose="00000600000000000000" pitchFamily="50" charset="0"/>
+            </a:endParaRPr>
+          </a:p>
+        </p:txBody>
+      </p:sp>
+      <p:sp>
+        <p:nvSpPr>
+          <p:cNvPr id="33" name="Speech Bubble: Rectangle with Corners Rounded 32">
+            <a:extLst>
+              <a:ext uri="{FF2B5EF4-FFF2-40B4-BE49-F238E27FC236}">
+                <a16:creationId xmlns:a16="http://schemas.microsoft.com/office/drawing/2014/main" id="{B1F90EA5-E19E-C785-50C2-9077EDA44738}"/>
+              </a:ext>
+            </a:extLst>
+          </p:cNvPr>
+          <p:cNvSpPr/>
+          <p:nvPr/>
+        </p:nvSpPr>
+        <p:spPr>
+          <a:xfrm>
+            <a:off x="2532330" y="4248662"/>
+            <a:ext cx="1758323" cy="607583"/>
+          </a:xfrm>
+          <a:prstGeom prst="wedgeRoundRectCallout">
+            <a:avLst>
+              <a:gd name="adj1" fmla="val 52704"/>
+              <a:gd name="adj2" fmla="val -145825"/>
+              <a:gd name="adj3" fmla="val 16667"/>
+            </a:avLst>
+          </a:prstGeom>
+          <a:solidFill>
+            <a:schemeClr val="bg1">
+              <a:lumMod val="95000"/>
+            </a:schemeClr>
+          </a:solidFill>
+          <a:ln>
+            <a:solidFill>
+              <a:srgbClr val="FF0000"/>
+            </a:solidFill>
+          </a:ln>
+        </p:spPr>
+        <p:style>
+          <a:lnRef idx="2">
+            <a:schemeClr val="accent1">
+              <a:shade val="15000"/>
+            </a:schemeClr>
+          </a:lnRef>
+          <a:fillRef idx="1">
+            <a:schemeClr val="accent1"/>
+          </a:fillRef>
+          <a:effectRef idx="0">
+            <a:schemeClr val="accent1"/>
+          </a:effectRef>
+          <a:fontRef idx="minor">
+            <a:schemeClr val="lt1"/>
+          </a:fontRef>
+        </p:style>
+        <p:txBody>
+          <a:bodyPr rtlCol="0" anchor="ctr"/>
+          <a:lstStyle/>
+          <a:p>
+            <a:pPr algn="ctr"/>
+            <a:r>
+              <a:rPr lang="en-US" sz="1000" dirty="0">
+                <a:solidFill>
+                  <a:schemeClr val="tx1"/>
+                </a:solidFill>
+                <a:latin typeface="Karbon Medium" panose="00000600000000000000" pitchFamily="50" charset="0"/>
+              </a:rPr>
+              <a:t>Use a different local port for connection #2 as </a:t>
+            </a:r>
+            <a:r>
+              <a:rPr lang="en-US" sz="1000" b="1" dirty="0">
+                <a:solidFill>
+                  <a:schemeClr val="accent6">
+                    <a:lumMod val="75000"/>
+                  </a:schemeClr>
+                </a:solidFill>
+                <a:latin typeface="Karbon Medium" panose="00000600000000000000" pitchFamily="50" charset="0"/>
+              </a:rPr>
+              <a:t>35550</a:t>
+            </a:r>
+            <a:r>
+              <a:rPr lang="en-US" sz="1000" dirty="0">
+                <a:solidFill>
+                  <a:schemeClr val="tx1"/>
+                </a:solidFill>
+                <a:latin typeface="Karbon Medium" panose="00000600000000000000" pitchFamily="50" charset="0"/>
+              </a:rPr>
+              <a:t> is being used by connection #1</a:t>
+            </a:r>
+            <a:endParaRPr lang="en-GB" sz="1000" dirty="0">
+              <a:solidFill>
+                <a:schemeClr val="tx1"/>
+              </a:solidFill>
+              <a:latin typeface="Karbon Medium" panose="00000600000000000000" pitchFamily="50" charset="0"/>
+            </a:endParaRPr>
+          </a:p>
+        </p:txBody>
+      </p:sp>
+      <p:cxnSp>
+        <p:nvCxnSpPr>
+          <p:cNvPr id="44" name="Connector: Elbow 43">
+            <a:extLst>
+              <a:ext uri="{FF2B5EF4-FFF2-40B4-BE49-F238E27FC236}">
+                <a16:creationId xmlns:a16="http://schemas.microsoft.com/office/drawing/2014/main" id="{E29D0B26-F36F-E750-85BE-64C3F0C20200}"/>
+              </a:ext>
+            </a:extLst>
+          </p:cNvPr>
+          <p:cNvCxnSpPr>
+            <a:cxnSpLocks/>
+          </p:cNvCxnSpPr>
+          <p:nvPr/>
+        </p:nvCxnSpPr>
+        <p:spPr>
+          <a:xfrm>
+            <a:off x="4151637" y="2886891"/>
+            <a:ext cx="3136364" cy="2047856"/>
+          </a:xfrm>
+          <a:prstGeom prst="bentConnector3">
+            <a:avLst>
+              <a:gd name="adj1" fmla="val 50000"/>
+            </a:avLst>
+          </a:prstGeom>
+          <a:ln w="57150">
+            <a:tailEnd type="triangle"/>
+          </a:ln>
+        </p:spPr>
+        <p:style>
+          <a:lnRef idx="2">
+            <a:schemeClr val="accent1"/>
+          </a:lnRef>
+          <a:fillRef idx="0">
+            <a:schemeClr val="accent1"/>
+          </a:fillRef>
+          <a:effectRef idx="1">
+            <a:schemeClr val="accent1"/>
+          </a:effectRef>
+          <a:fontRef idx="minor">
+            <a:schemeClr val="tx1"/>
+          </a:fontRef>
+        </p:style>
+      </p:cxnSp>
+      <p:cxnSp>
+        <p:nvCxnSpPr>
+          <p:cNvPr id="53" name="Connector: Elbow 52">
+            <a:extLst>
+              <a:ext uri="{FF2B5EF4-FFF2-40B4-BE49-F238E27FC236}">
+                <a16:creationId xmlns:a16="http://schemas.microsoft.com/office/drawing/2014/main" id="{8F3B3FDC-73F7-3CC5-E9A0-78425DC9E989}"/>
+              </a:ext>
+            </a:extLst>
+          </p:cNvPr>
+          <p:cNvCxnSpPr>
+            <a:cxnSpLocks/>
+          </p:cNvCxnSpPr>
+          <p:nvPr/>
+        </p:nvCxnSpPr>
+        <p:spPr>
+          <a:xfrm>
+            <a:off x="4151637" y="3278777"/>
+            <a:ext cx="3168644" cy="2176627"/>
+          </a:xfrm>
+          <a:prstGeom prst="bentConnector3">
+            <a:avLst>
+              <a:gd name="adj1" fmla="val 39281"/>
+            </a:avLst>
+          </a:prstGeom>
+          <a:ln w="57150">
+            <a:solidFill>
+              <a:srgbClr val="E97132"/>
+            </a:solidFill>
+            <a:headEnd type="triangle" w="med" len="med"/>
+            <a:tailEnd type="none" w="med" len="med"/>
+          </a:ln>
+        </p:spPr>
+        <p:style>
+          <a:lnRef idx="2">
+            <a:schemeClr val="accent1"/>
+          </a:lnRef>
+          <a:fillRef idx="0">
+            <a:schemeClr val="accent1"/>
+          </a:fillRef>
+          <a:effectRef idx="1">
+            <a:schemeClr val="accent1"/>
+          </a:effectRef>
+          <a:fontRef idx="minor">
+            <a:schemeClr val="tx1"/>
+          </a:fontRef>
+        </p:style>
+      </p:cxnSp>
+    </p:spTree>
+    <p:extLst>
+      <p:ext uri="{BB962C8B-B14F-4D97-AF65-F5344CB8AC3E}">
+        <p14:creationId xmlns:p14="http://schemas.microsoft.com/office/powerpoint/2010/main" val="1596934411"/>
+      </p:ext>
+    </p:extLst>
+  </p:cSld>
+  <p:clrMapOvr>
+    <a:masterClrMapping/>
+  </p:clrMapOvr>
+</p:sld>
+</file>
+
+<file path=ppt/slides/slide4.xml><?xml version="1.0" encoding="utf-8"?>
 <p:sld xmlns:a="http://schemas.openxmlformats.org/drawingml/2006/main" xmlns:r="http://schemas.openxmlformats.org/officeDocument/2006/relationships" xmlns:p="http://schemas.openxmlformats.org/presentationml/2006/main" showMasterSp="0">
   <p:cSld>
     <p:bg>
@@ -5477,7 +7137,7 @@
             <p:spPr>
               <a:xfrm>
                 <a:off x="4309322" y="824826"/>
-                <a:ext cx="1802416" cy="461665"/>
+                <a:ext cx="1720536" cy="461665"/>
               </a:xfrm>
               <a:prstGeom prst="rect">
                 <a:avLst/>
@@ -5503,7 +7163,7 @@
                     </a:solidFill>
                     <a:latin typeface="Karbon Medium" panose="00000600000000000000" pitchFamily="50" charset="0"/>
                   </a:rPr>
-                  <a:t>192.168.0.2</a:t>
+                  <a:t>192.168.0.21</a:t>
                 </a:r>
               </a:p>
               <a:p>
@@ -5640,7 +7300,7 @@
             <p:spPr>
               <a:xfrm>
                 <a:off x="4309322" y="2190205"/>
-                <a:ext cx="1275029" cy="276999"/>
+                <a:ext cx="1206741" cy="276999"/>
               </a:xfrm>
               <a:prstGeom prst="rect">
                 <a:avLst/>
@@ -5662,9 +7322,8 @@
                 <a:r>
                   <a:rPr lang="en-US" sz="1200" b="1" dirty="0">
                     <a:solidFill>
-                      <a:schemeClr val="tx2">
+                      <a:schemeClr val="accent6">
                         <a:lumMod val="75000"/>
-                        <a:lumOff val="25000"/>
                       </a:schemeClr>
                     </a:solidFill>
                     <a:latin typeface="Karbon Medium" panose="00000600000000000000" pitchFamily="50" charset="0"/>
@@ -5673,9 +7332,8 @@
                 </a:r>
                 <a:endParaRPr lang="en-GB" sz="1200" b="1" dirty="0">
                   <a:solidFill>
-                    <a:schemeClr val="tx2">
+                    <a:schemeClr val="accent6">
                       <a:lumMod val="75000"/>
-                      <a:lumOff val="25000"/>
                     </a:schemeClr>
                   </a:solidFill>
                   <a:latin typeface="Karbon Medium" panose="00000600000000000000" pitchFamily="50" charset="0"/>
@@ -5697,8 +7355,8 @@
             </p:nvSpPr>
             <p:spPr>
               <a:xfrm>
-                <a:off x="6026737" y="1999436"/>
-                <a:ext cx="1802416" cy="461665"/>
+                <a:off x="6137793" y="1999436"/>
+                <a:ext cx="1691360" cy="461665"/>
               </a:xfrm>
               <a:prstGeom prst="rect">
                 <a:avLst/>
@@ -5721,14 +7379,13 @@
                 <a:r>
                   <a:rPr lang="en-US" sz="1200" b="1" dirty="0">
                     <a:solidFill>
-                      <a:schemeClr val="tx2">
+                      <a:schemeClr val="accent6">
                         <a:lumMod val="75000"/>
-                        <a:lumOff val="25000"/>
                       </a:schemeClr>
                     </a:solidFill>
                     <a:latin typeface="Karbon Medium" panose="00000600000000000000" pitchFamily="50" charset="0"/>
                   </a:rPr>
-                  <a:t>192.168.0.1</a:t>
+                  <a:t>192.168.0.11</a:t>
                 </a:r>
               </a:p>
               <a:p>
@@ -5742,9 +7399,8 @@
                 <a:r>
                   <a:rPr lang="en-US" sz="1200" b="1" dirty="0">
                     <a:solidFill>
-                      <a:schemeClr val="tx2">
+                      <a:schemeClr val="accent6">
                         <a:lumMod val="75000"/>
-                        <a:lumOff val="25000"/>
                       </a:schemeClr>
                     </a:solidFill>
                     <a:latin typeface="Karbon Medium" panose="00000600000000000000" pitchFamily="50" charset="0"/>
@@ -5753,9 +7409,8 @@
                 </a:r>
                 <a:endParaRPr lang="en-GB" sz="1200" b="1" dirty="0">
                   <a:solidFill>
-                    <a:schemeClr val="tx2">
+                    <a:schemeClr val="accent6">
                       <a:lumMod val="75000"/>
-                      <a:lumOff val="25000"/>
                     </a:schemeClr>
                   </a:solidFill>
                   <a:latin typeface="Karbon Medium" panose="00000600000000000000" pitchFamily="50" charset="0"/>
@@ -6277,7 +7932,7 @@
             <p:spPr>
               <a:xfrm>
                 <a:off x="4309322" y="3604394"/>
-                <a:ext cx="1812035" cy="461665"/>
+                <a:ext cx="1740926" cy="461665"/>
               </a:xfrm>
               <a:prstGeom prst="rect">
                 <a:avLst/>
@@ -6305,7 +7960,7 @@
                     </a:solidFill>
                     <a:latin typeface="Karbon Medium" panose="00000600000000000000" pitchFamily="50" charset="0"/>
                   </a:rPr>
-                  <a:t>192.168.0.3</a:t>
+                  <a:t>192.168.0.22</a:t>
                 </a:r>
               </a:p>
               <a:p>
@@ -6450,7 +8105,7 @@
             <p:spPr>
               <a:xfrm>
                 <a:off x="4309322" y="4969773"/>
-                <a:ext cx="1275029" cy="276999"/>
+                <a:ext cx="1176669" cy="276999"/>
               </a:xfrm>
               <a:prstGeom prst="rect">
                 <a:avLst/>
@@ -6478,7 +8133,7 @@
                     </a:solidFill>
                     <a:latin typeface="Karbon Medium" panose="00000600000000000000" pitchFamily="50" charset="0"/>
                   </a:rPr>
-                  <a:t>35553</a:t>
+                  <a:t>35551</a:t>
                 </a:r>
                 <a:endParaRPr lang="en-GB" sz="1200" b="1" dirty="0">
                   <a:solidFill>
@@ -6505,8 +8160,8 @@
             </p:nvSpPr>
             <p:spPr>
               <a:xfrm>
-                <a:off x="5948189" y="4779004"/>
-                <a:ext cx="1880964" cy="461665"/>
+                <a:off x="6137793" y="4779004"/>
+                <a:ext cx="1691360" cy="461665"/>
               </a:xfrm>
               <a:prstGeom prst="rect">
                 <a:avLst/>
@@ -6555,7 +8210,7 @@
                     </a:solidFill>
                     <a:latin typeface="Karbon Medium" panose="00000600000000000000" pitchFamily="50" charset="0"/>
                   </a:rPr>
-                  <a:t>35553</a:t>
+                  <a:t>35551</a:t>
                 </a:r>
                 <a:endParaRPr lang="en-GB" sz="1200" b="1" dirty="0">
                   <a:solidFill>
@@ -6593,12 +8248,14 @@
                 <a:gd name="adj3" fmla="val 16667"/>
               </a:avLst>
             </a:prstGeom>
-            <a:noFill/>
+            <a:solidFill>
+              <a:schemeClr val="bg1">
+                <a:lumMod val="95000"/>
+              </a:schemeClr>
+            </a:solidFill>
             <a:ln>
               <a:solidFill>
-                <a:schemeClr val="bg1">
-                  <a:lumMod val="65000"/>
-                </a:schemeClr>
+                <a:srgbClr val="FF0000"/>
               </a:solidFill>
             </a:ln>
           </p:spPr>

</xml_diff>